<commit_message>
Work examples from real-life projects
</commit_message>
<xml_diff>
--- a/BDD - Specification By Examples.pptx
+++ b/BDD - Specification By Examples.pptx
@@ -2952,7 +2952,7 @@
                   <a:srgbClr val="00B050"/>
                 </a:solidFill>
               </a:rPr>
-              <a:t>Specification By Examples for </a:t>
+              <a:t>Specification By Examples (SBE's) for </a:t>
             </a:r>
             <a:br>
               <a:rPr lang="en-GB" altLang="en-US" sz="4000" b="1">
@@ -3003,7 +3003,7 @@
             </a:r>
             <a:r>
               <a:rPr lang="en-GB" altLang="en-US"/>
-              <a:t> is to elaborates various scenarios involved in Person to Person Payments as Specification by Examples.</a:t>
+              <a:t> is to elaborate a couple of multiple-step P2P scenarios presenting a flavour of Specification By Examples derived collaboratively between Business Analyst, Developer, Tester, and Architect.</a:t>
             </a:r>
             <a:endParaRPr lang="en-GB" altLang="en-US"/>
           </a:p>
@@ -3054,7 +3054,7 @@
                   <a:srgbClr val="00B050"/>
                 </a:solidFill>
               </a:rPr>
-              <a:t>Scenario: Share a lunch bill with friend </a:t>
+              <a:t>Scenario 1: Share a lunch bill with a friend </a:t>
             </a:r>
             <a:endParaRPr lang="en-GB" altLang="en-US" b="1">
               <a:solidFill>
@@ -3146,7 +3146,7 @@
                   <a:srgbClr val="00B050"/>
                 </a:solidFill>
               </a:rPr>
-              <a:t>THEN	I'm presented with my friends name and contact details to select and pay</a:t>
+              <a:t>THEN	I'm presented with my friends name and contact details to select and pay from</a:t>
             </a:r>
             <a:endParaRPr lang="en-GB" altLang="en-US" sz="1800">
               <a:solidFill>
@@ -3176,7 +3176,7 @@
                 </a:solidFill>
                 <a:sym typeface="+mn-ea"/>
               </a:rPr>
-              <a:t>GIVEN 	I'm presented with my friends name and contact details to select and pay</a:t>
+              <a:t>GIVEN 	I'm presented with my friends name and contact details to select and pay from</a:t>
             </a:r>
             <a:endParaRPr lang="en-GB" altLang="en-US" sz="1800">
               <a:solidFill>
@@ -3380,7 +3380,7 @@
                   <a:srgbClr val="00B050"/>
                 </a:solidFill>
               </a:rPr>
-              <a:t>Scenario: Request money from a friend</a:t>
+              <a:t>Scenario 2: Request money from a friend</a:t>
             </a:r>
             <a:endParaRPr lang="en-GB" altLang="en-US" b="1">
               <a:solidFill>
@@ -3523,7 +3523,7 @@
                 </a:solidFill>
                 <a:sym typeface="+mn-ea"/>
               </a:rPr>
-              <a:t>WHEN	I select the friends contact to request mony from </a:t>
+              <a:t>WHEN	I select the friends contact to request money from </a:t>
             </a:r>
             <a:endParaRPr lang="en-GB" altLang="en-US" sz="1800">
               <a:solidFill>
@@ -3573,7 +3573,7 @@
                 </a:solidFill>
                 <a:sym typeface="+mn-ea"/>
               </a:rPr>
-              <a:t>GIVEN 	I'm presented to enter the amount to pay in 2 decimal places</a:t>
+              <a:t>GIVEN 	I'm presented to enter the amount to request in 2 decimal places</a:t>
             </a:r>
             <a:endParaRPr lang="en-GB" altLang="en-US" sz="1800">
               <a:solidFill>

</xml_diff>